<commit_message>
bug fix + presentation
</commit_message>
<xml_diff>
--- a/.venv/Создание telegram бота.pptx
+++ b/.venv/Создание telegram бота.pptx
@@ -9,6 +9,10 @@
     <p:sldId id="257" r:id="rId3"/>
     <p:sldId id="258" r:id="rId4"/>
     <p:sldId id="259" r:id="rId5"/>
+    <p:sldId id="260" r:id="rId6"/>
+    <p:sldId id="261" r:id="rId7"/>
+    <p:sldId id="262" r:id="rId8"/>
+    <p:sldId id="263" r:id="rId9"/>
   </p:sldIdLst>
   <p:sldSz cx="12192000" cy="6858000"/>
   <p:notesSz cx="6858000" cy="9144000"/>
@@ -107,6 +111,11 @@
       </a:defRPr>
     </a:lvl9pPr>
   </p:defaultTextStyle>
+  <p:extLst>
+    <p:ext uri="{EFAFB233-063F-42B5-8137-9DF3F51BA10A}">
+      <p15:sldGuideLst xmlns:p15="http://schemas.microsoft.com/office/powerpoint/2012/main"/>
+    </p:ext>
+  </p:extLst>
 </p:presentation>
 </file>
 
@@ -257,7 +266,7 @@
           <a:p>
             <a:fld id="{4D047ECF-B661-416C-BF23-DBA487D0957B}" type="datetimeFigureOut">
               <a:rPr lang="ru-RU" smtClean="0"/>
-              <a:t>22.04.2024</a:t>
+              <a:t>23.04.2024</a:t>
             </a:fld>
             <a:endParaRPr lang="ru-RU"/>
           </a:p>
@@ -455,7 +464,7 @@
           <a:p>
             <a:fld id="{4D047ECF-B661-416C-BF23-DBA487D0957B}" type="datetimeFigureOut">
               <a:rPr lang="ru-RU" smtClean="0"/>
-              <a:t>22.04.2024</a:t>
+              <a:t>23.04.2024</a:t>
             </a:fld>
             <a:endParaRPr lang="ru-RU"/>
           </a:p>
@@ -663,7 +672,7 @@
           <a:p>
             <a:fld id="{4D047ECF-B661-416C-BF23-DBA487D0957B}" type="datetimeFigureOut">
               <a:rPr lang="ru-RU" smtClean="0"/>
-              <a:t>22.04.2024</a:t>
+              <a:t>23.04.2024</a:t>
             </a:fld>
             <a:endParaRPr lang="ru-RU"/>
           </a:p>
@@ -861,7 +870,7 @@
           <a:p>
             <a:fld id="{4D047ECF-B661-416C-BF23-DBA487D0957B}" type="datetimeFigureOut">
               <a:rPr lang="ru-RU" smtClean="0"/>
-              <a:t>22.04.2024</a:t>
+              <a:t>23.04.2024</a:t>
             </a:fld>
             <a:endParaRPr lang="ru-RU"/>
           </a:p>
@@ -1136,7 +1145,7 @@
           <a:p>
             <a:fld id="{4D047ECF-B661-416C-BF23-DBA487D0957B}" type="datetimeFigureOut">
               <a:rPr lang="ru-RU" smtClean="0"/>
-              <a:t>22.04.2024</a:t>
+              <a:t>23.04.2024</a:t>
             </a:fld>
             <a:endParaRPr lang="ru-RU"/>
           </a:p>
@@ -1401,7 +1410,7 @@
           <a:p>
             <a:fld id="{4D047ECF-B661-416C-BF23-DBA487D0957B}" type="datetimeFigureOut">
               <a:rPr lang="ru-RU" smtClean="0"/>
-              <a:t>22.04.2024</a:t>
+              <a:t>23.04.2024</a:t>
             </a:fld>
             <a:endParaRPr lang="ru-RU"/>
           </a:p>
@@ -1813,7 +1822,7 @@
           <a:p>
             <a:fld id="{4D047ECF-B661-416C-BF23-DBA487D0957B}" type="datetimeFigureOut">
               <a:rPr lang="ru-RU" smtClean="0"/>
-              <a:t>22.04.2024</a:t>
+              <a:t>23.04.2024</a:t>
             </a:fld>
             <a:endParaRPr lang="ru-RU"/>
           </a:p>
@@ -1954,7 +1963,7 @@
           <a:p>
             <a:fld id="{4D047ECF-B661-416C-BF23-DBA487D0957B}" type="datetimeFigureOut">
               <a:rPr lang="ru-RU" smtClean="0"/>
-              <a:t>22.04.2024</a:t>
+              <a:t>23.04.2024</a:t>
             </a:fld>
             <a:endParaRPr lang="ru-RU"/>
           </a:p>
@@ -2067,7 +2076,7 @@
           <a:p>
             <a:fld id="{4D047ECF-B661-416C-BF23-DBA487D0957B}" type="datetimeFigureOut">
               <a:rPr lang="ru-RU" smtClean="0"/>
-              <a:t>22.04.2024</a:t>
+              <a:t>23.04.2024</a:t>
             </a:fld>
             <a:endParaRPr lang="ru-RU"/>
           </a:p>
@@ -2378,7 +2387,7 @@
           <a:p>
             <a:fld id="{4D047ECF-B661-416C-BF23-DBA487D0957B}" type="datetimeFigureOut">
               <a:rPr lang="ru-RU" smtClean="0"/>
-              <a:t>22.04.2024</a:t>
+              <a:t>23.04.2024</a:t>
             </a:fld>
             <a:endParaRPr lang="ru-RU"/>
           </a:p>
@@ -2666,7 +2675,7 @@
           <a:p>
             <a:fld id="{4D047ECF-B661-416C-BF23-DBA487D0957B}" type="datetimeFigureOut">
               <a:rPr lang="ru-RU" smtClean="0"/>
-              <a:t>22.04.2024</a:t>
+              <a:t>23.04.2024</a:t>
             </a:fld>
             <a:endParaRPr lang="ru-RU"/>
           </a:p>
@@ -2907,7 +2916,7 @@
           <a:p>
             <a:fld id="{4D047ECF-B661-416C-BF23-DBA487D0957B}" type="datetimeFigureOut">
               <a:rPr lang="ru-RU" smtClean="0"/>
-              <a:t>22.04.2024</a:t>
+              <a:t>23.04.2024</a:t>
             </a:fld>
             <a:endParaRPr lang="ru-RU"/>
           </a:p>
@@ -3695,35 +3704,458 @@
           </a:p>
         </p:txBody>
       </p:sp>
-      <p:sp>
-        <p:nvSpPr>
-          <p:cNvPr id="3" name="Объект 2">
-            <a:extLst>
-              <a:ext uri="{FF2B5EF4-FFF2-40B4-BE49-F238E27FC236}">
-                <a16:creationId xmlns:a16="http://schemas.microsoft.com/office/drawing/2014/main" id="{E0D41825-240C-1979-C648-23B80032F076}"/>
-              </a:ext>
-            </a:extLst>
-          </p:cNvPr>
-          <p:cNvSpPr>
-            <a:spLocks noGrp="1"/>
-          </p:cNvSpPr>
-          <p:nvPr>
-            <p:ph idx="1"/>
-          </p:nvPr>
-        </p:nvSpPr>
-        <p:spPr/>
-        <p:txBody>
-          <a:bodyPr/>
-          <a:lstStyle/>
-          <a:p>
-            <a:endParaRPr lang="ru-RU" dirty="0"/>
-          </a:p>
-        </p:txBody>
-      </p:sp>
+      <p:pic>
+        <p:nvPicPr>
+          <p:cNvPr id="5" name="Рисунок 4">
+            <a:extLst>
+              <a:ext uri="{FF2B5EF4-FFF2-40B4-BE49-F238E27FC236}">
+                <a16:creationId xmlns:a16="http://schemas.microsoft.com/office/drawing/2014/main" id="{4EE8C341-41BF-82CB-54B3-4C1BF3C7766E}"/>
+              </a:ext>
+            </a:extLst>
+          </p:cNvPr>
+          <p:cNvPicPr>
+            <a:picLocks noChangeAspect="1"/>
+          </p:cNvPicPr>
+          <p:nvPr/>
+        </p:nvPicPr>
+        <p:blipFill>
+          <a:blip r:embed="rId2"/>
+          <a:stretch>
+            <a:fillRect/>
+          </a:stretch>
+        </p:blipFill>
+        <p:spPr>
+          <a:xfrm>
+            <a:off x="3238101" y="2281077"/>
+            <a:ext cx="5715798" cy="2295845"/>
+          </a:xfrm>
+          <a:prstGeom prst="rect">
+            <a:avLst/>
+          </a:prstGeom>
+        </p:spPr>
+      </p:pic>
     </p:spTree>
     <p:extLst>
       <p:ext uri="{BB962C8B-B14F-4D97-AF65-F5344CB8AC3E}">
         <p14:creationId xmlns:p14="http://schemas.microsoft.com/office/powerpoint/2010/main" val="3253421397"/>
+      </p:ext>
+    </p:extLst>
+  </p:cSld>
+  <p:clrMapOvr>
+    <a:masterClrMapping/>
+  </p:clrMapOvr>
+</p:sld>
+</file>
+
+<file path=ppt/slides/slide5.xml><?xml version="1.0" encoding="utf-8"?>
+<p:sld xmlns:a="http://schemas.openxmlformats.org/drawingml/2006/main" xmlns:r="http://schemas.openxmlformats.org/officeDocument/2006/relationships" xmlns:p="http://schemas.openxmlformats.org/presentationml/2006/main">
+  <p:cSld>
+    <p:spTree>
+      <p:nvGrpSpPr>
+        <p:cNvPr id="1" name=""/>
+        <p:cNvGrpSpPr/>
+        <p:nvPr/>
+      </p:nvGrpSpPr>
+      <p:grpSpPr>
+        <a:xfrm>
+          <a:off x="0" y="0"/>
+          <a:ext cx="0" cy="0"/>
+          <a:chOff x="0" y="0"/>
+          <a:chExt cx="0" cy="0"/>
+        </a:xfrm>
+      </p:grpSpPr>
+      <p:sp>
+        <p:nvSpPr>
+          <p:cNvPr id="2" name="Заголовок 1">
+            <a:extLst>
+              <a:ext uri="{FF2B5EF4-FFF2-40B4-BE49-F238E27FC236}">
+                <a16:creationId xmlns:a16="http://schemas.microsoft.com/office/drawing/2014/main" id="{6862D254-382C-79AA-F12F-FA009EFC8D82}"/>
+              </a:ext>
+            </a:extLst>
+          </p:cNvPr>
+          <p:cNvSpPr>
+            <a:spLocks noGrp="1"/>
+          </p:cNvSpPr>
+          <p:nvPr>
+            <p:ph type="title"/>
+          </p:nvPr>
+        </p:nvSpPr>
+        <p:spPr/>
+        <p:txBody>
+          <a:bodyPr/>
+          <a:lstStyle/>
+          <a:p>
+            <a:r>
+              <a:rPr lang="ru-RU" dirty="0"/>
+              <a:t>Получение и хранение данных</a:t>
+            </a:r>
+          </a:p>
+        </p:txBody>
+      </p:sp>
+      <p:sp>
+        <p:nvSpPr>
+          <p:cNvPr id="3" name="Объект 2">
+            <a:extLst>
+              <a:ext uri="{FF2B5EF4-FFF2-40B4-BE49-F238E27FC236}">
+                <a16:creationId xmlns:a16="http://schemas.microsoft.com/office/drawing/2014/main" id="{EC0EB5B9-D456-33B9-1CA2-4600A216BB7B}"/>
+              </a:ext>
+            </a:extLst>
+          </p:cNvPr>
+          <p:cNvSpPr>
+            <a:spLocks noGrp="1"/>
+          </p:cNvSpPr>
+          <p:nvPr>
+            <p:ph idx="1"/>
+          </p:nvPr>
+        </p:nvSpPr>
+        <p:spPr/>
+        <p:txBody>
+          <a:bodyPr/>
+          <a:lstStyle/>
+          <a:p>
+            <a:r>
+              <a:rPr lang="ru-RU" dirty="0"/>
+              <a:t>Все данные я брал с открытых источников и хранил в БД или в папке с определенным назначением(например графические объекты).</a:t>
+            </a:r>
+          </a:p>
+        </p:txBody>
+      </p:sp>
+      <p:pic>
+        <p:nvPicPr>
+          <p:cNvPr id="5" name="Рисунок 4">
+            <a:extLst>
+              <a:ext uri="{FF2B5EF4-FFF2-40B4-BE49-F238E27FC236}">
+                <a16:creationId xmlns:a16="http://schemas.microsoft.com/office/drawing/2014/main" id="{ED7D2544-CD72-0C74-7D4F-4A4FAAFC7A5E}"/>
+              </a:ext>
+            </a:extLst>
+          </p:cNvPr>
+          <p:cNvPicPr>
+            <a:picLocks noChangeAspect="1"/>
+          </p:cNvPicPr>
+          <p:nvPr/>
+        </p:nvPicPr>
+        <p:blipFill>
+          <a:blip r:embed="rId2"/>
+          <a:stretch>
+            <a:fillRect/>
+          </a:stretch>
+        </p:blipFill>
+        <p:spPr>
+          <a:xfrm>
+            <a:off x="2010812" y="3716158"/>
+            <a:ext cx="2762636" cy="1409897"/>
+          </a:xfrm>
+          <a:prstGeom prst="rect">
+            <a:avLst/>
+          </a:prstGeom>
+          <a:effectLst>
+            <a:outerShdw blurRad="50800" dist="38100" dir="2700000" algn="tl" rotWithShape="0">
+              <a:prstClr val="black">
+                <a:alpha val="40000"/>
+              </a:prstClr>
+            </a:outerShdw>
+          </a:effectLst>
+        </p:spPr>
+      </p:pic>
+      <p:pic>
+        <p:nvPicPr>
+          <p:cNvPr id="7" name="Рисунок 6">
+            <a:extLst>
+              <a:ext uri="{FF2B5EF4-FFF2-40B4-BE49-F238E27FC236}">
+                <a16:creationId xmlns:a16="http://schemas.microsoft.com/office/drawing/2014/main" id="{0742631E-3B13-AF7D-7943-9FA596A109B7}"/>
+              </a:ext>
+            </a:extLst>
+          </p:cNvPr>
+          <p:cNvPicPr>
+            <a:picLocks noChangeAspect="1"/>
+          </p:cNvPicPr>
+          <p:nvPr/>
+        </p:nvPicPr>
+        <p:blipFill>
+          <a:blip r:embed="rId3"/>
+          <a:stretch>
+            <a:fillRect/>
+          </a:stretch>
+        </p:blipFill>
+        <p:spPr>
+          <a:xfrm>
+            <a:off x="5066858" y="2999368"/>
+            <a:ext cx="5993532" cy="2485902"/>
+          </a:xfrm>
+          <a:prstGeom prst="rect">
+            <a:avLst/>
+          </a:prstGeom>
+          <a:effectLst>
+            <a:outerShdw blurRad="50800" dist="38100" dir="5400000" algn="t" rotWithShape="0">
+              <a:prstClr val="black">
+                <a:alpha val="40000"/>
+              </a:prstClr>
+            </a:outerShdw>
+          </a:effectLst>
+        </p:spPr>
+      </p:pic>
+    </p:spTree>
+    <p:extLst>
+      <p:ext uri="{BB962C8B-B14F-4D97-AF65-F5344CB8AC3E}">
+        <p14:creationId xmlns:p14="http://schemas.microsoft.com/office/powerpoint/2010/main" val="1707322685"/>
+      </p:ext>
+    </p:extLst>
+  </p:cSld>
+  <p:clrMapOvr>
+    <a:masterClrMapping/>
+  </p:clrMapOvr>
+</p:sld>
+</file>
+
+<file path=ppt/slides/slide6.xml><?xml version="1.0" encoding="utf-8"?>
+<p:sld xmlns:a="http://schemas.openxmlformats.org/drawingml/2006/main" xmlns:r="http://schemas.openxmlformats.org/officeDocument/2006/relationships" xmlns:p="http://schemas.openxmlformats.org/presentationml/2006/main">
+  <p:cSld>
+    <p:spTree>
+      <p:nvGrpSpPr>
+        <p:cNvPr id="1" name=""/>
+        <p:cNvGrpSpPr/>
+        <p:nvPr/>
+      </p:nvGrpSpPr>
+      <p:grpSpPr>
+        <a:xfrm>
+          <a:off x="0" y="0"/>
+          <a:ext cx="0" cy="0"/>
+          <a:chOff x="0" y="0"/>
+          <a:chExt cx="0" cy="0"/>
+        </a:xfrm>
+      </p:grpSpPr>
+      <p:sp>
+        <p:nvSpPr>
+          <p:cNvPr id="2" name="Заголовок 1">
+            <a:extLst>
+              <a:ext uri="{FF2B5EF4-FFF2-40B4-BE49-F238E27FC236}">
+                <a16:creationId xmlns:a16="http://schemas.microsoft.com/office/drawing/2014/main" id="{9995148B-700B-5A04-11E9-8576580049A1}"/>
+              </a:ext>
+            </a:extLst>
+          </p:cNvPr>
+          <p:cNvSpPr>
+            <a:spLocks noGrp="1"/>
+          </p:cNvSpPr>
+          <p:nvPr>
+            <p:ph type="title"/>
+          </p:nvPr>
+        </p:nvSpPr>
+        <p:spPr/>
+        <p:txBody>
+          <a:bodyPr>
+            <a:normAutofit fontScale="90000"/>
+          </a:bodyPr>
+          <a:lstStyle/>
+          <a:p>
+            <a:r>
+              <a:rPr lang="ru-RU" dirty="0"/>
+              <a:t>Этот проект дал мне возможность поработать с телеграмм ботом и узнать много нового</a:t>
+            </a:r>
+          </a:p>
+        </p:txBody>
+      </p:sp>
+      <p:pic>
+        <p:nvPicPr>
+          <p:cNvPr id="5" name="Объект 4">
+            <a:extLst>
+              <a:ext uri="{FF2B5EF4-FFF2-40B4-BE49-F238E27FC236}">
+                <a16:creationId xmlns:a16="http://schemas.microsoft.com/office/drawing/2014/main" id="{4B6558CC-40BF-1F2E-C1BA-D3A1C2CB840D}"/>
+              </a:ext>
+            </a:extLst>
+          </p:cNvPr>
+          <p:cNvPicPr>
+            <a:picLocks noGrp="1" noChangeAspect="1"/>
+          </p:cNvPicPr>
+          <p:nvPr>
+            <p:ph idx="1"/>
+          </p:nvPr>
+        </p:nvPicPr>
+        <p:blipFill>
+          <a:blip r:embed="rId2"/>
+          <a:stretch>
+            <a:fillRect/>
+          </a:stretch>
+        </p:blipFill>
+        <p:spPr>
+          <a:xfrm>
+            <a:off x="4002835" y="1825625"/>
+            <a:ext cx="4186329" cy="4351338"/>
+          </a:xfrm>
+        </p:spPr>
+      </p:pic>
+    </p:spTree>
+    <p:extLst>
+      <p:ext uri="{BB962C8B-B14F-4D97-AF65-F5344CB8AC3E}">
+        <p14:creationId xmlns:p14="http://schemas.microsoft.com/office/powerpoint/2010/main" val="3366541543"/>
+      </p:ext>
+    </p:extLst>
+  </p:cSld>
+  <p:clrMapOvr>
+    <a:masterClrMapping/>
+  </p:clrMapOvr>
+</p:sld>
+</file>
+
+<file path=ppt/slides/slide7.xml><?xml version="1.0" encoding="utf-8"?>
+<p:sld xmlns:a="http://schemas.openxmlformats.org/drawingml/2006/main" xmlns:r="http://schemas.openxmlformats.org/officeDocument/2006/relationships" xmlns:p="http://schemas.openxmlformats.org/presentationml/2006/main">
+  <p:cSld>
+    <p:spTree>
+      <p:nvGrpSpPr>
+        <p:cNvPr id="1" name=""/>
+        <p:cNvGrpSpPr/>
+        <p:nvPr/>
+      </p:nvGrpSpPr>
+      <p:grpSpPr>
+        <a:xfrm>
+          <a:off x="0" y="0"/>
+          <a:ext cx="0" cy="0"/>
+          <a:chOff x="0" y="0"/>
+          <a:chExt cx="0" cy="0"/>
+        </a:xfrm>
+      </p:grpSpPr>
+      <p:sp>
+        <p:nvSpPr>
+          <p:cNvPr id="2" name="Заголовок 1">
+            <a:extLst>
+              <a:ext uri="{FF2B5EF4-FFF2-40B4-BE49-F238E27FC236}">
+                <a16:creationId xmlns:a16="http://schemas.microsoft.com/office/drawing/2014/main" id="{29F549A5-A2B6-708C-2B1A-CF0DFD2E2C5E}"/>
+              </a:ext>
+            </a:extLst>
+          </p:cNvPr>
+          <p:cNvSpPr>
+            <a:spLocks noGrp="1"/>
+          </p:cNvSpPr>
+          <p:nvPr>
+            <p:ph type="title"/>
+          </p:nvPr>
+        </p:nvSpPr>
+        <p:spPr/>
+        <p:txBody>
+          <a:bodyPr/>
+          <a:lstStyle/>
+          <a:p>
+            <a:r>
+              <a:rPr lang="ru-RU" dirty="0"/>
+              <a:t>Вопросы…</a:t>
+            </a:r>
+          </a:p>
+        </p:txBody>
+      </p:sp>
+      <p:sp>
+        <p:nvSpPr>
+          <p:cNvPr id="3" name="Объект 2">
+            <a:extLst>
+              <a:ext uri="{FF2B5EF4-FFF2-40B4-BE49-F238E27FC236}">
+                <a16:creationId xmlns:a16="http://schemas.microsoft.com/office/drawing/2014/main" id="{3856B553-5BC9-E194-9E31-49478478E780}"/>
+              </a:ext>
+            </a:extLst>
+          </p:cNvPr>
+          <p:cNvSpPr>
+            <a:spLocks noGrp="1"/>
+          </p:cNvSpPr>
+          <p:nvPr>
+            <p:ph idx="1"/>
+          </p:nvPr>
+        </p:nvSpPr>
+        <p:spPr/>
+        <p:txBody>
+          <a:bodyPr/>
+          <a:lstStyle/>
+          <a:p>
+            <a:endParaRPr lang="ru-RU"/>
+          </a:p>
+        </p:txBody>
+      </p:sp>
+    </p:spTree>
+    <p:extLst>
+      <p:ext uri="{BB962C8B-B14F-4D97-AF65-F5344CB8AC3E}">
+        <p14:creationId xmlns:p14="http://schemas.microsoft.com/office/powerpoint/2010/main" val="1457139184"/>
+      </p:ext>
+    </p:extLst>
+  </p:cSld>
+  <p:clrMapOvr>
+    <a:masterClrMapping/>
+  </p:clrMapOvr>
+</p:sld>
+</file>
+
+<file path=ppt/slides/slide8.xml><?xml version="1.0" encoding="utf-8"?>
+<p:sld xmlns:a="http://schemas.openxmlformats.org/drawingml/2006/main" xmlns:r="http://schemas.openxmlformats.org/officeDocument/2006/relationships" xmlns:p="http://schemas.openxmlformats.org/presentationml/2006/main">
+  <p:cSld>
+    <p:spTree>
+      <p:nvGrpSpPr>
+        <p:cNvPr id="1" name=""/>
+        <p:cNvGrpSpPr/>
+        <p:nvPr/>
+      </p:nvGrpSpPr>
+      <p:grpSpPr>
+        <a:xfrm>
+          <a:off x="0" y="0"/>
+          <a:ext cx="0" cy="0"/>
+          <a:chOff x="0" y="0"/>
+          <a:chExt cx="0" cy="0"/>
+        </a:xfrm>
+      </p:grpSpPr>
+      <p:sp>
+        <p:nvSpPr>
+          <p:cNvPr id="2" name="Заголовок 1">
+            <a:extLst>
+              <a:ext uri="{FF2B5EF4-FFF2-40B4-BE49-F238E27FC236}">
+                <a16:creationId xmlns:a16="http://schemas.microsoft.com/office/drawing/2014/main" id="{9B1488DF-4E04-4ACC-E2D3-EAA9FA3EDC05}"/>
+              </a:ext>
+            </a:extLst>
+          </p:cNvPr>
+          <p:cNvSpPr>
+            <a:spLocks noGrp="1"/>
+          </p:cNvSpPr>
+          <p:nvPr>
+            <p:ph type="title"/>
+          </p:nvPr>
+        </p:nvSpPr>
+        <p:spPr/>
+        <p:txBody>
+          <a:bodyPr/>
+          <a:lstStyle/>
+          <a:p>
+            <a:r>
+              <a:rPr lang="ru-RU" dirty="0"/>
+              <a:t>Спасибо за внимание</a:t>
+            </a:r>
+          </a:p>
+        </p:txBody>
+      </p:sp>
+      <p:sp>
+        <p:nvSpPr>
+          <p:cNvPr id="3" name="Объект 2">
+            <a:extLst>
+              <a:ext uri="{FF2B5EF4-FFF2-40B4-BE49-F238E27FC236}">
+                <a16:creationId xmlns:a16="http://schemas.microsoft.com/office/drawing/2014/main" id="{9B3EB8B0-781E-BD06-F071-ECC75D6851F1}"/>
+              </a:ext>
+            </a:extLst>
+          </p:cNvPr>
+          <p:cNvSpPr>
+            <a:spLocks noGrp="1"/>
+          </p:cNvSpPr>
+          <p:nvPr>
+            <p:ph idx="1"/>
+          </p:nvPr>
+        </p:nvSpPr>
+        <p:spPr/>
+        <p:txBody>
+          <a:bodyPr/>
+          <a:lstStyle/>
+          <a:p>
+            <a:r>
+              <a:rPr lang="ru-RU" dirty="0"/>
+              <a:t>Дайте хорошую оценку, пожалуйста</a:t>
+            </a:r>
+          </a:p>
+        </p:txBody>
+      </p:sp>
+    </p:spTree>
+    <p:extLst>
+      <p:ext uri="{BB962C8B-B14F-4D97-AF65-F5344CB8AC3E}">
+        <p14:creationId xmlns:p14="http://schemas.microsoft.com/office/powerpoint/2010/main" val="1045416010"/>
       </p:ext>
     </p:extLst>
   </p:cSld>

</xml_diff>